<commit_message>
Added [ic to PP
</commit_message>
<xml_diff>
--- a/Presentate.pptx
+++ b/Presentate.pptx
@@ -305,7 +305,7 @@
             <a:fld id="{1D8BD707-D9CF-40AE-B4C6-C98DA3205C09}" type="datetimeFigureOut">
               <a:rPr lang="en-US" smtClean="0"/>
               <a:pPr/>
-              <a:t>12/9/2014</a:t>
+              <a:t>12/10/2014</a:t>
             </a:fld>
             <a:endParaRPr lang="en-US"/>
           </a:p>
@@ -472,7 +472,7 @@
             <a:fld id="{1D8BD707-D9CF-40AE-B4C6-C98DA3205C09}" type="datetimeFigureOut">
               <a:rPr lang="en-US" smtClean="0"/>
               <a:pPr/>
-              <a:t>12/9/2014</a:t>
+              <a:t>12/10/2014</a:t>
             </a:fld>
             <a:endParaRPr lang="en-US"/>
           </a:p>
@@ -649,7 +649,7 @@
             <a:fld id="{1D8BD707-D9CF-40AE-B4C6-C98DA3205C09}" type="datetimeFigureOut">
               <a:rPr lang="en-US" smtClean="0"/>
               <a:pPr/>
-              <a:t>12/9/2014</a:t>
+              <a:t>12/10/2014</a:t>
             </a:fld>
             <a:endParaRPr lang="en-US"/>
           </a:p>
@@ -816,7 +816,7 @@
             <a:fld id="{1D8BD707-D9CF-40AE-B4C6-C98DA3205C09}" type="datetimeFigureOut">
               <a:rPr lang="en-US" smtClean="0"/>
               <a:pPr/>
-              <a:t>12/9/2014</a:t>
+              <a:t>12/10/2014</a:t>
             </a:fld>
             <a:endParaRPr lang="en-US"/>
           </a:p>
@@ -1059,7 +1059,7 @@
             <a:fld id="{1D8BD707-D9CF-40AE-B4C6-C98DA3205C09}" type="datetimeFigureOut">
               <a:rPr lang="en-US" smtClean="0"/>
               <a:pPr/>
-              <a:t>12/9/2014</a:t>
+              <a:t>12/10/2014</a:t>
             </a:fld>
             <a:endParaRPr lang="en-US"/>
           </a:p>
@@ -1344,7 +1344,7 @@
             <a:fld id="{1D8BD707-D9CF-40AE-B4C6-C98DA3205C09}" type="datetimeFigureOut">
               <a:rPr lang="en-US" smtClean="0"/>
               <a:pPr/>
-              <a:t>12/9/2014</a:t>
+              <a:t>12/10/2014</a:t>
             </a:fld>
             <a:endParaRPr lang="en-US"/>
           </a:p>
@@ -1763,7 +1763,7 @@
             <a:fld id="{1D8BD707-D9CF-40AE-B4C6-C98DA3205C09}" type="datetimeFigureOut">
               <a:rPr lang="en-US" smtClean="0"/>
               <a:pPr/>
-              <a:t>12/9/2014</a:t>
+              <a:t>12/10/2014</a:t>
             </a:fld>
             <a:endParaRPr lang="en-US"/>
           </a:p>
@@ -1878,7 +1878,7 @@
             <a:fld id="{1D8BD707-D9CF-40AE-B4C6-C98DA3205C09}" type="datetimeFigureOut">
               <a:rPr lang="en-US" smtClean="0"/>
               <a:pPr/>
-              <a:t>12/9/2014</a:t>
+              <a:t>12/10/2014</a:t>
             </a:fld>
             <a:endParaRPr lang="en-US"/>
           </a:p>
@@ -1970,7 +1970,7 @@
             <a:fld id="{1D8BD707-D9CF-40AE-B4C6-C98DA3205C09}" type="datetimeFigureOut">
               <a:rPr lang="en-US" smtClean="0"/>
               <a:pPr/>
-              <a:t>12/9/2014</a:t>
+              <a:t>12/10/2014</a:t>
             </a:fld>
             <a:endParaRPr lang="en-US"/>
           </a:p>
@@ -2244,7 +2244,7 @@
             <a:fld id="{1D8BD707-D9CF-40AE-B4C6-C98DA3205C09}" type="datetimeFigureOut">
               <a:rPr lang="en-US" smtClean="0"/>
               <a:pPr/>
-              <a:t>12/9/2014</a:t>
+              <a:t>12/10/2014</a:t>
             </a:fld>
             <a:endParaRPr lang="en-US"/>
           </a:p>
@@ -2494,7 +2494,7 @@
             <a:fld id="{1D8BD707-D9CF-40AE-B4C6-C98DA3205C09}" type="datetimeFigureOut">
               <a:rPr lang="en-US" smtClean="0"/>
               <a:pPr/>
-              <a:t>12/9/2014</a:t>
+              <a:t>12/10/2014</a:t>
             </a:fld>
             <a:endParaRPr lang="en-US"/>
           </a:p>
@@ -2704,7 +2704,7 @@
             <a:fld id="{1D8BD707-D9CF-40AE-B4C6-C98DA3205C09}" type="datetimeFigureOut">
               <a:rPr lang="en-US" smtClean="0"/>
               <a:pPr/>
-              <a:t>12/9/2014</a:t>
+              <a:t>12/10/2014</a:t>
             </a:fld>
             <a:endParaRPr lang="en-US"/>
           </a:p>
@@ -3197,11 +3197,7 @@
           <a:p>
             <a:r>
               <a:rPr lang="en-US" dirty="0" smtClean="0"/>
-              <a:t>Choosing </a:t>
-            </a:r>
-            <a:r>
-              <a:rPr lang="en-US" dirty="0" smtClean="0"/>
-              <a:t>Day</a:t>
+              <a:t>Choosing Day</a:t>
             </a:r>
             <a:endParaRPr lang="en-US" dirty="0"/>
           </a:p>
@@ -3213,7 +3209,6 @@
               <a:rPr lang="en-US" dirty="0" smtClean="0"/>
               <a:t>Affects timeslot availability</a:t>
             </a:r>
-            <a:endParaRPr lang="en-US" dirty="0" smtClean="0"/>
           </a:p>
         </p:txBody>
       </p:sp>
@@ -3301,13 +3296,8 @@
           <a:p>
             <a:r>
               <a:rPr lang="en-US" dirty="0" smtClean="0"/>
-              <a:t>Choosing </a:t>
-            </a:r>
-            <a:r>
-              <a:rPr lang="en-US" dirty="0" smtClean="0"/>
-              <a:t>Time</a:t>
-            </a:r>
-            <a:endParaRPr lang="en-US" dirty="0" smtClean="0"/>
+              <a:t>Choosing Time</a:t>
+            </a:r>
           </a:p>
           <a:p>
             <a:endParaRPr lang="en-US" dirty="0"/>
@@ -3481,11 +3471,7 @@
           <a:p>
             <a:r>
               <a:rPr lang="en-US" dirty="0" smtClean="0"/>
-              <a:t>Personal </a:t>
-            </a:r>
-            <a:r>
-              <a:rPr lang="en-US" dirty="0" smtClean="0"/>
-              <a:t>Page</a:t>
+              <a:t>Personal Page</a:t>
             </a:r>
           </a:p>
           <a:p>
@@ -3496,7 +3482,6 @@
               <a:rPr lang="en-US" dirty="0" smtClean="0"/>
               <a:t>States time, day, and professor</a:t>
             </a:r>
-            <a:endParaRPr lang="en-US" dirty="0" smtClean="0"/>
           </a:p>
         </p:txBody>
       </p:sp>
@@ -3585,11 +3570,7 @@
           <a:p>
             <a:r>
               <a:rPr lang="en-US" dirty="0" smtClean="0"/>
-              <a:t>Previous timeslot </a:t>
-            </a:r>
-            <a:r>
-              <a:rPr lang="en-US" dirty="0" smtClean="0"/>
-              <a:t>entry overwritten, freeing it up.</a:t>
+              <a:t>Previous timeslot entry overwritten, freeing it up.</a:t>
             </a:r>
             <a:endParaRPr lang="en-US" dirty="0"/>
           </a:p>
@@ -3691,7 +3672,6 @@
               <a:rPr lang="en-US" dirty="0" smtClean="0"/>
               <a:t>ata for user and app</a:t>
             </a:r>
-            <a:endParaRPr lang="en-US" dirty="0" smtClean="0"/>
           </a:p>
           <a:p>
             <a:endParaRPr lang="en-US" dirty="0" smtClean="0"/>
@@ -3811,18 +3791,12 @@
               <a:rPr lang="en-US" dirty="0" smtClean="0"/>
               <a:t>Validation, canceling appointments</a:t>
             </a:r>
-            <a:endParaRPr lang="en-US" dirty="0" smtClean="0"/>
-          </a:p>
-          <a:p>
-            <a:r>
-              <a:rPr lang="en-US" dirty="0" smtClean="0"/>
-              <a:t>Using </a:t>
-            </a:r>
-            <a:r>
-              <a:rPr lang="en-US" dirty="0" smtClean="0"/>
-              <a:t>database to store data</a:t>
-            </a:r>
-            <a:endParaRPr lang="en-US" dirty="0" smtClean="0"/>
+          </a:p>
+          <a:p>
+            <a:r>
+              <a:rPr lang="en-US" dirty="0" smtClean="0"/>
+              <a:t>Using database to store data</a:t>
+            </a:r>
           </a:p>
         </p:txBody>
       </p:sp>
@@ -3990,11 +3964,7 @@
           <a:p>
             <a:r>
               <a:rPr lang="en-US" dirty="0" smtClean="0"/>
-              <a:t>Lead </a:t>
-            </a:r>
-            <a:r>
-              <a:rPr lang="en-US" dirty="0" smtClean="0"/>
-              <a:t>Programmer</a:t>
+              <a:t>Lead Programmer</a:t>
             </a:r>
           </a:p>
           <a:p>
@@ -4108,14 +4078,48 @@
           <a:p>
             <a:r>
               <a:rPr lang="en-US" dirty="0" smtClean="0"/>
-              <a:t>Lead Designer</a:t>
-            </a:r>
+              <a:t>Lead </a:t>
+            </a:r>
+            <a:r>
+              <a:rPr lang="en-US" dirty="0" smtClean="0"/>
+              <a:t>Designer</a:t>
+            </a:r>
+          </a:p>
+          <a:p>
+            <a:pPr marL="0" indent="0">
+              <a:buNone/>
+            </a:pPr>
             <a:endParaRPr lang="en-US" dirty="0"/>
           </a:p>
           <a:p>
             <a:r>
               <a:rPr lang="en-US" dirty="0" smtClean="0"/>
-              <a:t>President of UMBC Anime Society</a:t>
+              <a:t>President of </a:t>
+            </a:r>
+            <a:r>
+              <a:rPr lang="en-US" dirty="0" smtClean="0"/>
+              <a:t>UMBC</a:t>
+            </a:r>
+          </a:p>
+          <a:p>
+            <a:pPr marL="0" indent="0">
+              <a:buNone/>
+            </a:pPr>
+            <a:r>
+              <a:rPr lang="en-US" dirty="0"/>
+              <a:t> </a:t>
+            </a:r>
+            <a:r>
+              <a:rPr lang="en-US" dirty="0" smtClean="0"/>
+              <a:t>  </a:t>
+            </a:r>
+            <a:r>
+              <a:rPr lang="en-US" dirty="0" smtClean="0"/>
+              <a:t> </a:t>
+            </a:r>
+            <a:r>
+              <a:rPr lang="en-US" dirty="0" smtClean="0"/>
+              <a:t>Anime Society</a:t>
             </a:r>
           </a:p>
           <a:p>
@@ -4126,6 +4130,60 @@
           </a:p>
         </p:txBody>
       </p:sp>
+      <p:pic>
+        <p:nvPicPr>
+          <p:cNvPr id="1026" name="Picture 2"/>
+          <p:cNvPicPr>
+            <a:picLocks noChangeAspect="1" noChangeArrowheads="1"/>
+          </p:cNvPicPr>
+          <p:nvPr/>
+        </p:nvPicPr>
+        <p:blipFill>
+          <a:blip r:embed="rId2">
+            <a:extLst>
+              <a:ext uri="{28A0092B-C50C-407E-A947-70E740481C1C}">
+                <a14:useLocalDpi xmlns:a14="http://schemas.microsoft.com/office/drawing/2010/main" val="0"/>
+              </a:ext>
+            </a:extLst>
+          </a:blip>
+          <a:srcRect/>
+          <a:stretch>
+            <a:fillRect/>
+          </a:stretch>
+        </p:blipFill>
+        <p:spPr bwMode="auto">
+          <a:xfrm>
+            <a:off x="4571999" y="1771650"/>
+            <a:ext cx="3581401" cy="4041580"/>
+          </a:xfrm>
+          <a:prstGeom prst="rect">
+            <a:avLst/>
+          </a:prstGeom>
+          <a:noFill/>
+          <a:ln>
+            <a:noFill/>
+          </a:ln>
+          <a:extLst>
+            <a:ext uri="{909E8E84-426E-40DD-AFC4-6F175D3DCCD1}">
+              <a14:hiddenFill xmlns:a14="http://schemas.microsoft.com/office/drawing/2010/main">
+                <a:solidFill>
+                  <a:schemeClr val="accent1"/>
+                </a:solidFill>
+              </a14:hiddenFill>
+            </a:ext>
+            <a:ext uri="{91240B29-F687-4F45-9708-019B960494DF}">
+              <a14:hiddenLine xmlns:a14="http://schemas.microsoft.com/office/drawing/2010/main" w="9525">
+                <a:solidFill>
+                  <a:schemeClr val="tx1"/>
+                </a:solidFill>
+                <a:miter lim="800000"/>
+                <a:headEnd/>
+                <a:tailEnd/>
+              </a14:hiddenLine>
+            </a:ext>
+          </a:extLst>
+        </p:spPr>
+      </p:pic>
     </p:spTree>
     <p:extLst>
       <p:ext uri="{BB962C8B-B14F-4D97-AF65-F5344CB8AC3E}">
@@ -4250,11 +4308,7 @@
             </a:pPr>
             <a:r>
               <a:rPr lang="en-US" dirty="0" smtClean="0"/>
-              <a:t>You’re </a:t>
-            </a:r>
-            <a:r>
-              <a:rPr lang="en-US" dirty="0" smtClean="0"/>
-              <a:t>hoping that you get advised before </a:t>
+              <a:t>You’re hoping that you get advised before </a:t>
             </a:r>
           </a:p>
           <a:p>
@@ -4693,11 +4747,7 @@
           <a:p>
             <a:r>
               <a:rPr lang="en-US" dirty="0" smtClean="0"/>
-              <a:t>The start </a:t>
-            </a:r>
-            <a:r>
-              <a:rPr lang="en-US" dirty="0" smtClean="0"/>
-              <a:t>screen</a:t>
+              <a:t>The start screen</a:t>
             </a:r>
           </a:p>
           <a:p>
@@ -4788,13 +4838,8 @@
           <a:p>
             <a:r>
               <a:rPr lang="en-US" dirty="0" smtClean="0"/>
-              <a:t>Choosing Professor and </a:t>
-            </a:r>
-            <a:r>
-              <a:rPr lang="en-US" dirty="0" smtClean="0"/>
-              <a:t>Class</a:t>
-            </a:r>
-            <a:endParaRPr lang="en-US" dirty="0" smtClean="0"/>
+              <a:t>Choosing Professor and Class</a:t>
+            </a:r>
           </a:p>
           <a:p>
             <a:endParaRPr lang="en-US" dirty="0"/>

</xml_diff>